<commit_message>
add perspective splite menu
</commit_message>
<xml_diff>
--- a/02HTML/4Canvas/DEMO/CanvasGame.pptx
+++ b/02HTML/4Canvas/DEMO/CanvasGame.pptx
@@ -111,6 +111,11 @@
       </a:defRPr>
     </a:lvl9pPr>
   </p:defaultTextStyle>
+  <p:extLst>
+    <p:ext uri="{EFAFB233-063F-42B5-8137-9DF3F51BA10A}">
+      <p15:sldGuideLst xmlns:p15="http://schemas.microsoft.com/office/powerpoint/2012/main"/>
+    </p:ext>
+  </p:extLst>
 </p:presentation>
 </file>
 
@@ -196,7 +201,7 @@
           <a:p>
             <a:fld id="{95E2EFD0-2AF7-DD43-8053-2292C37A6ECD}" type="datetimeFigureOut">
               <a:rPr lang="en-US" smtClean="0"/>
-              <a:t>4/23/19</a:t>
+              <a:t>7/11/19</a:t>
             </a:fld>
             <a:endParaRPr lang="en-US"/>
           </a:p>
@@ -595,7 +600,7 @@
           <a:p>
             <a:fld id="{E80F3443-BE91-1C4B-B79F-CBBD0D16F5BF}" type="datetimeFigureOut">
               <a:rPr lang="en-US" smtClean="0"/>
-              <a:t>4/23/19</a:t>
+              <a:t>7/11/19</a:t>
             </a:fld>
             <a:endParaRPr lang="en-US"/>
           </a:p>
@@ -765,7 +770,7 @@
           <a:p>
             <a:fld id="{E80F3443-BE91-1C4B-B79F-CBBD0D16F5BF}" type="datetimeFigureOut">
               <a:rPr lang="en-US" smtClean="0"/>
-              <a:t>4/23/19</a:t>
+              <a:t>7/11/19</a:t>
             </a:fld>
             <a:endParaRPr lang="en-US"/>
           </a:p>
@@ -945,7 +950,7 @@
           <a:p>
             <a:fld id="{E80F3443-BE91-1C4B-B79F-CBBD0D16F5BF}" type="datetimeFigureOut">
               <a:rPr lang="en-US" smtClean="0"/>
-              <a:t>4/23/19</a:t>
+              <a:t>7/11/19</a:t>
             </a:fld>
             <a:endParaRPr lang="en-US"/>
           </a:p>
@@ -1115,7 +1120,7 @@
           <a:p>
             <a:fld id="{E80F3443-BE91-1C4B-B79F-CBBD0D16F5BF}" type="datetimeFigureOut">
               <a:rPr lang="en-US" smtClean="0"/>
-              <a:t>4/23/19</a:t>
+              <a:t>7/11/19</a:t>
             </a:fld>
             <a:endParaRPr lang="en-US"/>
           </a:p>
@@ -1361,7 +1366,7 @@
           <a:p>
             <a:fld id="{E80F3443-BE91-1C4B-B79F-CBBD0D16F5BF}" type="datetimeFigureOut">
               <a:rPr lang="en-US" smtClean="0"/>
-              <a:t>4/23/19</a:t>
+              <a:t>7/11/19</a:t>
             </a:fld>
             <a:endParaRPr lang="en-US"/>
           </a:p>
@@ -1593,7 +1598,7 @@
           <a:p>
             <a:fld id="{E80F3443-BE91-1C4B-B79F-CBBD0D16F5BF}" type="datetimeFigureOut">
               <a:rPr lang="en-US" smtClean="0"/>
-              <a:t>4/23/19</a:t>
+              <a:t>7/11/19</a:t>
             </a:fld>
             <a:endParaRPr lang="en-US"/>
           </a:p>
@@ -1960,7 +1965,7 @@
           <a:p>
             <a:fld id="{E80F3443-BE91-1C4B-B79F-CBBD0D16F5BF}" type="datetimeFigureOut">
               <a:rPr lang="en-US" smtClean="0"/>
-              <a:t>4/23/19</a:t>
+              <a:t>7/11/19</a:t>
             </a:fld>
             <a:endParaRPr lang="en-US"/>
           </a:p>
@@ -2078,7 +2083,7 @@
           <a:p>
             <a:fld id="{E80F3443-BE91-1C4B-B79F-CBBD0D16F5BF}" type="datetimeFigureOut">
               <a:rPr lang="en-US" smtClean="0"/>
-              <a:t>4/23/19</a:t>
+              <a:t>7/11/19</a:t>
             </a:fld>
             <a:endParaRPr lang="en-US"/>
           </a:p>
@@ -2173,7 +2178,7 @@
           <a:p>
             <a:fld id="{E80F3443-BE91-1C4B-B79F-CBBD0D16F5BF}" type="datetimeFigureOut">
               <a:rPr lang="en-US" smtClean="0"/>
-              <a:t>4/23/19</a:t>
+              <a:t>7/11/19</a:t>
             </a:fld>
             <a:endParaRPr lang="en-US"/>
           </a:p>
@@ -2450,7 +2455,7 @@
           <a:p>
             <a:fld id="{E80F3443-BE91-1C4B-B79F-CBBD0D16F5BF}" type="datetimeFigureOut">
               <a:rPr lang="en-US" smtClean="0"/>
-              <a:t>4/23/19</a:t>
+              <a:t>7/11/19</a:t>
             </a:fld>
             <a:endParaRPr lang="en-US"/>
           </a:p>
@@ -2703,7 +2708,7 @@
           <a:p>
             <a:fld id="{E80F3443-BE91-1C4B-B79F-CBBD0D16F5BF}" type="datetimeFigureOut">
               <a:rPr lang="en-US" smtClean="0"/>
-              <a:t>4/23/19</a:t>
+              <a:t>7/11/19</a:t>
             </a:fld>
             <a:endParaRPr lang="en-US"/>
           </a:p>
@@ -2916,7 +2921,7 @@
           <a:p>
             <a:fld id="{E80F3443-BE91-1C4B-B79F-CBBD0D16F5BF}" type="datetimeFigureOut">
               <a:rPr lang="en-US" smtClean="0"/>
-              <a:t>4/23/19</a:t>
+              <a:t>7/11/19</a:t>
             </a:fld>
             <a:endParaRPr lang="en-US"/>
           </a:p>
@@ -3343,7 +3348,15 @@
           <a:p>
             <a:r>
               <a:rPr lang="zh-CN" altLang="en-US" dirty="0" smtClean="0"/>
-              <a:t>滑雪得分游戏</a:t>
+              <a:t>竞技</a:t>
+            </a:r>
+            <a:r>
+              <a:rPr lang="zh-CN" altLang="en-US" dirty="0" smtClean="0"/>
+              <a:t>得分</a:t>
+            </a:r>
+            <a:r>
+              <a:rPr lang="zh-CN" altLang="en-US" dirty="0" smtClean="0"/>
+              <a:t>游戏</a:t>
             </a:r>
             <a:endParaRPr lang="en-US" dirty="0"/>
           </a:p>
@@ -3367,7 +3380,7 @@
         </p:spPr>
         <p:txBody>
           <a:bodyPr>
-            <a:normAutofit lnSpcReduction="10000"/>
+            <a:normAutofit fontScale="77500" lnSpcReduction="20000"/>
           </a:bodyPr>
           <a:lstStyle/>
           <a:p>
@@ -3375,18 +3388,6 @@
               <a:buFont typeface="Arial" charset="0"/>
               <a:buChar char="•"/>
             </a:pPr>
-            <a:r>
-              <a:rPr lang="zh-CN" altLang="en-US" dirty="0" smtClean="0"/>
-              <a:t>基于</a:t>
-            </a:r>
-            <a:r>
-              <a:rPr lang="en-US" altLang="zh-CN" dirty="0" smtClean="0"/>
-              <a:t>canvas</a:t>
-            </a:r>
-            <a:r>
-              <a:rPr lang="zh-CN" altLang="en-US" dirty="0" smtClean="0"/>
-              <a:t>的绘制</a:t>
-            </a:r>
             <a:endParaRPr lang="en-US" altLang="zh-CN" dirty="0" smtClean="0"/>
           </a:p>
           <a:p>
@@ -3396,7 +3397,22 @@
             </a:pPr>
             <a:r>
               <a:rPr lang="zh-CN" altLang="en-US" dirty="0" smtClean="0"/>
-              <a:t>状态控制</a:t>
+              <a:t>关卡</a:t>
+            </a:r>
+            <a:endParaRPr lang="en-US" altLang="zh-CN" dirty="0" smtClean="0"/>
+          </a:p>
+          <a:p>
+            <a:pPr marL="342900" indent="-342900" algn="l">
+              <a:buFont typeface="Arial" charset="0"/>
+              <a:buChar char="•"/>
+            </a:pPr>
+            <a:r>
+              <a:rPr lang="zh-CN" altLang="en-US" dirty="0" smtClean="0"/>
+              <a:t>状态</a:t>
+            </a:r>
+            <a:r>
+              <a:rPr lang="zh-CN" altLang="en-US" dirty="0" smtClean="0"/>
+              <a:t>控制</a:t>
             </a:r>
             <a:endParaRPr lang="en-US" altLang="zh-CN" dirty="0" smtClean="0"/>
           </a:p>
@@ -3471,15 +3487,11 @@
           <a:p>
             <a:r>
               <a:rPr lang="zh-CN" altLang="en-US" dirty="0" smtClean="0"/>
-              <a:t>一、</a:t>
-            </a:r>
-            <a:r>
-              <a:rPr lang="en-US" altLang="zh-CN" dirty="0" smtClean="0"/>
-              <a:t>Canvas</a:t>
+              <a:t>一</a:t>
             </a:r>
             <a:r>
               <a:rPr lang="zh-CN" altLang="en-US" dirty="0" smtClean="0"/>
-              <a:t>的绘制</a:t>
+              <a:t>、关卡</a:t>
             </a:r>
             <a:endParaRPr lang="en-US" dirty="0"/>
           </a:p>
@@ -3495,24 +3507,195 @@
             <p:ph idx="1"/>
           </p:nvPr>
         </p:nvSpPr>
-        <p:spPr/>
-        <p:txBody>
-          <a:bodyPr/>
-          <a:lstStyle/>
-          <a:p>
-            <a:r>
-              <a:rPr lang="zh-CN" altLang="en-US" dirty="0" smtClean="0"/>
-              <a:t>基于</a:t>
-            </a:r>
-            <a:r>
-              <a:rPr lang="en-US" altLang="zh-CN" dirty="0" smtClean="0"/>
-              <a:t>Canvas</a:t>
-            </a:r>
-            <a:r>
-              <a:rPr lang="zh-CN" altLang="en-US" dirty="0" smtClean="0"/>
-              <a:t>的动态绘制功能，逐帧绘制动态的图片、形状。使动画连贯优美。</a:t>
-            </a:r>
-            <a:endParaRPr lang="en-US" altLang="zh-CN" dirty="0" smtClean="0"/>
+        <p:spPr>
+          <a:xfrm>
+            <a:off x="838200" y="1825625"/>
+            <a:ext cx="10699679" cy="4351338"/>
+          </a:xfrm>
+        </p:spPr>
+        <p:txBody>
+          <a:bodyPr>
+            <a:normAutofit/>
+          </a:bodyPr>
+          <a:lstStyle/>
+          <a:p>
+            <a:r>
+              <a:rPr lang="zh-CN" altLang="en-US" sz="2000" dirty="0" smtClean="0"/>
+              <a:t>共分为</a:t>
+            </a:r>
+            <a:r>
+              <a:rPr lang="en-US" altLang="zh-CN" sz="2000" dirty="0" smtClean="0"/>
+              <a:t>3</a:t>
+            </a:r>
+            <a:r>
+              <a:rPr lang="zh-CN" altLang="en-US" sz="2000" dirty="0" smtClean="0"/>
+              <a:t>个关卡，分别是：雪地</a:t>
+            </a:r>
+            <a:r>
+              <a:rPr lang="zh-CN" altLang="en-US" sz="2000" dirty="0" smtClean="0"/>
+              <a:t>、沙漠、大海</a:t>
+            </a:r>
+            <a:endParaRPr lang="en-US" altLang="zh-CN" sz="2000" dirty="0" smtClean="0"/>
+          </a:p>
+          <a:p>
+            <a:r>
+              <a:rPr lang="zh-CN" altLang="en-US" sz="2000" dirty="0" smtClean="0"/>
+              <a:t>不同的场景对应的奖励和惩罚物品各不相同。</a:t>
+            </a:r>
+            <a:endParaRPr lang="en-US" altLang="zh-CN" sz="2000" dirty="0" smtClean="0"/>
+          </a:p>
+          <a:p>
+            <a:r>
+              <a:rPr lang="zh-CN" altLang="en-US" sz="2000" dirty="0" smtClean="0"/>
+              <a:t>雪地：石块</a:t>
+            </a:r>
+            <a:r>
+              <a:rPr lang="en-US" altLang="zh-CN" sz="2000" dirty="0" smtClean="0"/>
+              <a:t>(</a:t>
+            </a:r>
+            <a:r>
+              <a:rPr lang="zh-CN" altLang="en-US" sz="2000" dirty="0" smtClean="0"/>
+              <a:t>减血</a:t>
+            </a:r>
+            <a:r>
+              <a:rPr lang="en-US" altLang="zh-CN" sz="2000" dirty="0" smtClean="0"/>
+              <a:t>)</a:t>
+            </a:r>
+            <a:r>
+              <a:rPr lang="zh-CN" altLang="en-US" sz="2000" dirty="0" smtClean="0"/>
+              <a:t>、宝石</a:t>
+            </a:r>
+            <a:r>
+              <a:rPr lang="en-US" altLang="zh-CN" sz="2000" dirty="0"/>
+              <a:t>(</a:t>
+            </a:r>
+            <a:r>
+              <a:rPr lang="zh-CN" altLang="en-US" sz="2000" dirty="0" smtClean="0"/>
+              <a:t>加分</a:t>
+            </a:r>
+            <a:r>
+              <a:rPr lang="en-US" altLang="zh-CN" sz="2000" dirty="0" smtClean="0"/>
+              <a:t>)</a:t>
+            </a:r>
+            <a:r>
+              <a:rPr lang="zh-CN" altLang="en-US" sz="2000" dirty="0" smtClean="0"/>
+              <a:t>、鸡尾酒</a:t>
+            </a:r>
+            <a:r>
+              <a:rPr lang="en-US" altLang="zh-CN" sz="2000" dirty="0" smtClean="0"/>
+              <a:t>(</a:t>
+            </a:r>
+            <a:r>
+              <a:rPr lang="zh-CN" altLang="en-US" sz="2000" dirty="0" smtClean="0"/>
+              <a:t>加血</a:t>
+            </a:r>
+            <a:r>
+              <a:rPr lang="en-US" altLang="zh-CN" sz="2000" dirty="0"/>
+              <a:t>)</a:t>
+            </a:r>
+            <a:endParaRPr lang="en-US" altLang="zh-CN" sz="2000" dirty="0" smtClean="0"/>
+          </a:p>
+          <a:p>
+            <a:r>
+              <a:rPr lang="zh-CN" altLang="en-US" sz="2000" dirty="0" smtClean="0"/>
+              <a:t>沙漠：仙人掌</a:t>
+            </a:r>
+            <a:r>
+              <a:rPr lang="en-US" altLang="zh-CN" sz="2000" dirty="0"/>
+              <a:t>(</a:t>
+            </a:r>
+            <a:r>
+              <a:rPr lang="zh-CN" altLang="en-US" sz="2000" dirty="0"/>
+              <a:t>减血</a:t>
+            </a:r>
+            <a:r>
+              <a:rPr lang="en-US" altLang="zh-CN" sz="2000" dirty="0"/>
+              <a:t>) </a:t>
+            </a:r>
+            <a:r>
+              <a:rPr lang="zh-CN" altLang="en-US" sz="2000" dirty="0" smtClean="0"/>
+              <a:t>、水壶</a:t>
+            </a:r>
+            <a:r>
+              <a:rPr lang="en-US" altLang="zh-CN" sz="2000" dirty="0"/>
+              <a:t>(</a:t>
+            </a:r>
+            <a:r>
+              <a:rPr lang="zh-CN" altLang="en-US" sz="2000" dirty="0"/>
+              <a:t>加分</a:t>
+            </a:r>
+            <a:r>
+              <a:rPr lang="en-US" altLang="zh-CN" sz="2000" dirty="0" smtClean="0"/>
+              <a:t>)</a:t>
+            </a:r>
+            <a:r>
+              <a:rPr lang="zh-CN" altLang="en-US" sz="2000" dirty="0" smtClean="0"/>
+              <a:t>、鸡尾酒</a:t>
+            </a:r>
+            <a:r>
+              <a:rPr lang="en-US" altLang="zh-CN" sz="2000" dirty="0" smtClean="0"/>
+              <a:t>(</a:t>
+            </a:r>
+            <a:r>
+              <a:rPr lang="zh-CN" altLang="en-US" sz="2000" dirty="0" smtClean="0"/>
+              <a:t>加血</a:t>
+            </a:r>
+            <a:r>
+              <a:rPr lang="en-US" altLang="zh-CN" sz="2000" dirty="0"/>
+              <a:t>)</a:t>
+            </a:r>
+            <a:endParaRPr lang="en-US" altLang="zh-CN" sz="2000" dirty="0" smtClean="0"/>
+          </a:p>
+          <a:p>
+            <a:r>
+              <a:rPr lang="zh-CN" altLang="en-US" sz="2000" dirty="0" smtClean="0"/>
+              <a:t>大海：易拉罐</a:t>
+            </a:r>
+            <a:r>
+              <a:rPr lang="en-US" altLang="zh-CN" sz="2000" dirty="0"/>
+              <a:t>(</a:t>
+            </a:r>
+            <a:r>
+              <a:rPr lang="zh-CN" altLang="en-US" sz="2000" dirty="0"/>
+              <a:t>减血</a:t>
+            </a:r>
+            <a:r>
+              <a:rPr lang="en-US" altLang="zh-CN" sz="2000" dirty="0"/>
+              <a:t>) </a:t>
+            </a:r>
+            <a:r>
+              <a:rPr lang="zh-CN" altLang="en-US" sz="2000" dirty="0" smtClean="0"/>
+              <a:t>、氧气</a:t>
+            </a:r>
+            <a:r>
+              <a:rPr lang="en-US" altLang="zh-CN" sz="2000" dirty="0"/>
+              <a:t>(</a:t>
+            </a:r>
+            <a:r>
+              <a:rPr lang="zh-CN" altLang="en-US" sz="2000" dirty="0"/>
+              <a:t>加分</a:t>
+            </a:r>
+            <a:r>
+              <a:rPr lang="en-US" altLang="zh-CN" sz="2000" dirty="0" smtClean="0"/>
+              <a:t>)</a:t>
+            </a:r>
+            <a:r>
+              <a:rPr lang="zh-CN" altLang="en-US" sz="2000" dirty="0" smtClean="0"/>
+              <a:t>、鸡尾酒</a:t>
+            </a:r>
+            <a:r>
+              <a:rPr lang="en-US" altLang="zh-CN" sz="2000" dirty="0" smtClean="0"/>
+              <a:t>(</a:t>
+            </a:r>
+            <a:r>
+              <a:rPr lang="zh-CN" altLang="en-US" sz="2000" dirty="0" smtClean="0"/>
+              <a:t>加血</a:t>
+            </a:r>
+            <a:r>
+              <a:rPr lang="en-US" altLang="zh-CN" sz="2000" dirty="0"/>
+              <a:t>)</a:t>
+            </a:r>
+            <a:endParaRPr lang="en-US" altLang="zh-CN" sz="2000" dirty="0" smtClean="0"/>
           </a:p>
         </p:txBody>
       </p:sp>
@@ -3677,9 +3860,20 @@
           <a:p>
             <a:r>
               <a:rPr lang="zh-CN" altLang="en-US" dirty="0" smtClean="0"/>
-              <a:t>把每种物体封装成一个对象，给对象赋值属性和方法。例如，主场景、云朵、大树、雪花、钻石、雪橇、障碍物。</a:t>
-            </a:r>
-            <a:endParaRPr lang="en-US" dirty="0"/>
+              <a:t>把每种物体封装成一个对象，给对象赋值属性和方法。例如，主场景、云朵、大树、雪花、钻石、雪橇、障碍物</a:t>
+            </a:r>
+            <a:r>
+              <a:rPr lang="zh-CN" altLang="en-US" dirty="0" smtClean="0"/>
+              <a:t>。</a:t>
+            </a:r>
+            <a:endParaRPr lang="en-US" altLang="zh-CN" dirty="0" smtClean="0"/>
+          </a:p>
+          <a:p>
+            <a:r>
+              <a:rPr lang="zh-CN" altLang="en-US" dirty="0" smtClean="0"/>
+              <a:t>原型继承：所有的奖励和惩罚都继承了同一个类。</a:t>
+            </a:r>
+            <a:endParaRPr lang="en-US" altLang="zh-CN" dirty="0" smtClean="0"/>
           </a:p>
         </p:txBody>
       </p:sp>
@@ -3753,7 +3947,15 @@
           <a:p>
             <a:r>
               <a:rPr lang="zh-CN" altLang="en-US" dirty="0" smtClean="0"/>
-              <a:t>对物体进行碰撞检测，实时获取物体在场景中的位置在进行判断。例如人物碰到钻石则获取得分或者人物碰到障碍物则游戏结束。</a:t>
+              <a:t>对物体进行碰撞检测，实时获取物体在场景中的位置在进行判断。例如人物碰到钻石则获取</a:t>
+            </a:r>
+            <a:r>
+              <a:rPr lang="zh-CN" altLang="en-US" dirty="0" smtClean="0"/>
+              <a:t>得分，人物</a:t>
+            </a:r>
+            <a:r>
+              <a:rPr lang="zh-CN" altLang="en-US" dirty="0" smtClean="0"/>
+              <a:t>碰到障碍物则游戏结束。</a:t>
             </a:r>
             <a:endParaRPr lang="en-US" dirty="0"/>
           </a:p>

</xml_diff>